<commit_message>
Added Lecture 14 plus samples and remove some test code
</commit_message>
<xml_diff>
--- a/12-Algorithms.pptx
+++ b/12-Algorithms.pptx
@@ -226,7 +226,7 @@
           <a:p>
             <a:fld id="{1A052DDE-B79B-4585-97B6-DCDE6083B029}" type="datetimeFigureOut">
               <a:rPr lang="bg-BG" smtClean="0"/>
-              <a:t>13.8.2015 г.</a:t>
+              <a:t>1.9.2015 г.</a:t>
             </a:fld>
             <a:endParaRPr lang="bg-BG"/>
           </a:p>
@@ -675,7 +675,7 @@
           <a:p>
             <a:fld id="{3EA744D9-3FBE-48D8-BF2A-85DF203E4D20}" type="datetimeFigureOut">
               <a:rPr lang="bg-BG" smtClean="0"/>
-              <a:t>13.8.2015 г.</a:t>
+              <a:t>1.9.2015 г.</a:t>
             </a:fld>
             <a:endParaRPr lang="bg-BG"/>
           </a:p>
@@ -845,7 +845,7 @@
           <a:p>
             <a:fld id="{3EA744D9-3FBE-48D8-BF2A-85DF203E4D20}" type="datetimeFigureOut">
               <a:rPr lang="bg-BG" smtClean="0"/>
-              <a:t>13.8.2015 г.</a:t>
+              <a:t>1.9.2015 г.</a:t>
             </a:fld>
             <a:endParaRPr lang="bg-BG"/>
           </a:p>
@@ -1025,7 +1025,7 @@
           <a:p>
             <a:fld id="{3EA744D9-3FBE-48D8-BF2A-85DF203E4D20}" type="datetimeFigureOut">
               <a:rPr lang="bg-BG" smtClean="0"/>
-              <a:t>13.8.2015 г.</a:t>
+              <a:t>1.9.2015 г.</a:t>
             </a:fld>
             <a:endParaRPr lang="bg-BG"/>
           </a:p>
@@ -1195,7 +1195,7 @@
           <a:p>
             <a:fld id="{3EA744D9-3FBE-48D8-BF2A-85DF203E4D20}" type="datetimeFigureOut">
               <a:rPr lang="bg-BG" smtClean="0"/>
-              <a:t>13.8.2015 г.</a:t>
+              <a:t>1.9.2015 г.</a:t>
             </a:fld>
             <a:endParaRPr lang="bg-BG"/>
           </a:p>
@@ -1441,7 +1441,7 @@
           <a:p>
             <a:fld id="{3EA744D9-3FBE-48D8-BF2A-85DF203E4D20}" type="datetimeFigureOut">
               <a:rPr lang="bg-BG" smtClean="0"/>
-              <a:t>13.8.2015 г.</a:t>
+              <a:t>1.9.2015 г.</a:t>
             </a:fld>
             <a:endParaRPr lang="bg-BG"/>
           </a:p>
@@ -1729,7 +1729,7 @@
           <a:p>
             <a:fld id="{3EA744D9-3FBE-48D8-BF2A-85DF203E4D20}" type="datetimeFigureOut">
               <a:rPr lang="bg-BG" smtClean="0"/>
-              <a:t>13.8.2015 г.</a:t>
+              <a:t>1.9.2015 г.</a:t>
             </a:fld>
             <a:endParaRPr lang="bg-BG"/>
           </a:p>
@@ -2151,7 +2151,7 @@
           <a:p>
             <a:fld id="{3EA744D9-3FBE-48D8-BF2A-85DF203E4D20}" type="datetimeFigureOut">
               <a:rPr lang="bg-BG" smtClean="0"/>
-              <a:t>13.8.2015 г.</a:t>
+              <a:t>1.9.2015 г.</a:t>
             </a:fld>
             <a:endParaRPr lang="bg-BG"/>
           </a:p>
@@ -2269,7 +2269,7 @@
           <a:p>
             <a:fld id="{3EA744D9-3FBE-48D8-BF2A-85DF203E4D20}" type="datetimeFigureOut">
               <a:rPr lang="bg-BG" smtClean="0"/>
-              <a:t>13.8.2015 г.</a:t>
+              <a:t>1.9.2015 г.</a:t>
             </a:fld>
             <a:endParaRPr lang="bg-BG"/>
           </a:p>
@@ -2364,7 +2364,7 @@
           <a:p>
             <a:fld id="{3EA744D9-3FBE-48D8-BF2A-85DF203E4D20}" type="datetimeFigureOut">
               <a:rPr lang="bg-BG" smtClean="0"/>
-              <a:t>13.8.2015 г.</a:t>
+              <a:t>1.9.2015 г.</a:t>
             </a:fld>
             <a:endParaRPr lang="bg-BG"/>
           </a:p>
@@ -2641,7 +2641,7 @@
           <a:p>
             <a:fld id="{3EA744D9-3FBE-48D8-BF2A-85DF203E4D20}" type="datetimeFigureOut">
               <a:rPr lang="bg-BG" smtClean="0"/>
-              <a:t>13.8.2015 г.</a:t>
+              <a:t>1.9.2015 г.</a:t>
             </a:fld>
             <a:endParaRPr lang="bg-BG"/>
           </a:p>
@@ -2894,7 +2894,7 @@
           <a:p>
             <a:fld id="{3EA744D9-3FBE-48D8-BF2A-85DF203E4D20}" type="datetimeFigureOut">
               <a:rPr lang="bg-BG" smtClean="0"/>
-              <a:t>13.8.2015 г.</a:t>
+              <a:t>1.9.2015 г.</a:t>
             </a:fld>
             <a:endParaRPr lang="bg-BG"/>
           </a:p>
@@ -3116,7 +3116,7 @@
           <a:p>
             <a:fld id="{3EA744D9-3FBE-48D8-BF2A-85DF203E4D20}" type="datetimeFigureOut">
               <a:rPr lang="bg-BG" smtClean="0"/>
-              <a:t>13.8.2015 г.</a:t>
+              <a:t>1.9.2015 г.</a:t>
             </a:fld>
             <a:endParaRPr lang="bg-BG"/>
           </a:p>
@@ -5585,8 +5585,35 @@
                   </a:schemeClr>
                 </a:solidFill>
               </a:rPr>
-              <a:t>Сложността на алгоритъм се обозначава с т. нар. нотация Bit-O</a:t>
-            </a:r>
+              <a:t>Сложността на алгоритъм се обозначава с т. нар. нотация </a:t>
+            </a:r>
+            <a:r>
+              <a:rPr lang="en-US" dirty="0" smtClean="0">
+                <a:solidFill>
+                  <a:schemeClr val="bg1">
+                    <a:lumMod val="95000"/>
+                  </a:schemeClr>
+                </a:solidFill>
+              </a:rPr>
+              <a:t>Big</a:t>
+            </a:r>
+            <a:r>
+              <a:rPr lang="ru-RU" dirty="0" smtClean="0">
+                <a:solidFill>
+                  <a:schemeClr val="bg1">
+                    <a:lumMod val="95000"/>
+                  </a:schemeClr>
+                </a:solidFill>
+              </a:rPr>
+              <a:t>-O</a:t>
+            </a:r>
+            <a:endParaRPr lang="ru-RU" dirty="0">
+              <a:solidFill>
+                <a:schemeClr val="bg1">
+                  <a:lumMod val="95000"/>
+                </a:schemeClr>
+              </a:solidFill>
+            </a:endParaRPr>
           </a:p>
         </p:txBody>
       </p:sp>

</xml_diff>